<commit_message>
modified ppt and added doc
</commit_message>
<xml_diff>
--- a/assets/CPSC 531 Final Presentation Real Time Analysis Of BTC Network Congestion.pptx
+++ b/assets/CPSC 531 Final Presentation Real Time Analysis Of BTC Network Congestion.pptx
@@ -296,7 +296,7 @@
           <a:p>
             <a:fld id="{5413AE75-6D63-4E51-84FC-1D4679E4148F}" type="datetimeFigureOut">
               <a:rPr lang="en-US" smtClean="0"/>
-              <a:t>5/2/2023</a:t>
+              <a:t>5/3/2023</a:t>
             </a:fld>
             <a:endParaRPr lang="en-US"/>
           </a:p>
@@ -494,7 +494,7 @@
           <a:p>
             <a:fld id="{5413AE75-6D63-4E51-84FC-1D4679E4148F}" type="datetimeFigureOut">
               <a:rPr lang="en-US" smtClean="0"/>
-              <a:t>5/2/2023</a:t>
+              <a:t>5/3/2023</a:t>
             </a:fld>
             <a:endParaRPr lang="en-US"/>
           </a:p>
@@ -702,7 +702,7 @@
           <a:p>
             <a:fld id="{5413AE75-6D63-4E51-84FC-1D4679E4148F}" type="datetimeFigureOut">
               <a:rPr lang="en-US" smtClean="0"/>
-              <a:t>5/2/2023</a:t>
+              <a:t>5/3/2023</a:t>
             </a:fld>
             <a:endParaRPr lang="en-US"/>
           </a:p>
@@ -900,7 +900,7 @@
           <a:p>
             <a:fld id="{5413AE75-6D63-4E51-84FC-1D4679E4148F}" type="datetimeFigureOut">
               <a:rPr lang="en-US" smtClean="0"/>
-              <a:t>5/2/2023</a:t>
+              <a:t>5/3/2023</a:t>
             </a:fld>
             <a:endParaRPr lang="en-US"/>
           </a:p>
@@ -1175,7 +1175,7 @@
           <a:p>
             <a:fld id="{5413AE75-6D63-4E51-84FC-1D4679E4148F}" type="datetimeFigureOut">
               <a:rPr lang="en-US" smtClean="0"/>
-              <a:t>5/2/2023</a:t>
+              <a:t>5/3/2023</a:t>
             </a:fld>
             <a:endParaRPr lang="en-US"/>
           </a:p>
@@ -1440,7 +1440,7 @@
           <a:p>
             <a:fld id="{5413AE75-6D63-4E51-84FC-1D4679E4148F}" type="datetimeFigureOut">
               <a:rPr lang="en-US" smtClean="0"/>
-              <a:t>5/2/2023</a:t>
+              <a:t>5/3/2023</a:t>
             </a:fld>
             <a:endParaRPr lang="en-US"/>
           </a:p>
@@ -1852,7 +1852,7 @@
           <a:p>
             <a:fld id="{5413AE75-6D63-4E51-84FC-1D4679E4148F}" type="datetimeFigureOut">
               <a:rPr lang="en-US" smtClean="0"/>
-              <a:t>5/2/2023</a:t>
+              <a:t>5/3/2023</a:t>
             </a:fld>
             <a:endParaRPr lang="en-US"/>
           </a:p>
@@ -1993,7 +1993,7 @@
           <a:p>
             <a:fld id="{5413AE75-6D63-4E51-84FC-1D4679E4148F}" type="datetimeFigureOut">
               <a:rPr lang="en-US" smtClean="0"/>
-              <a:t>5/2/2023</a:t>
+              <a:t>5/3/2023</a:t>
             </a:fld>
             <a:endParaRPr lang="en-US"/>
           </a:p>
@@ -2106,7 +2106,7 @@
           <a:p>
             <a:fld id="{5413AE75-6D63-4E51-84FC-1D4679E4148F}" type="datetimeFigureOut">
               <a:rPr lang="en-US" smtClean="0"/>
-              <a:t>5/2/2023</a:t>
+              <a:t>5/3/2023</a:t>
             </a:fld>
             <a:endParaRPr lang="en-US"/>
           </a:p>
@@ -2417,7 +2417,7 @@
           <a:p>
             <a:fld id="{5413AE75-6D63-4E51-84FC-1D4679E4148F}" type="datetimeFigureOut">
               <a:rPr lang="en-US" smtClean="0"/>
-              <a:t>5/2/2023</a:t>
+              <a:t>5/3/2023</a:t>
             </a:fld>
             <a:endParaRPr lang="en-US"/>
           </a:p>
@@ -2705,7 +2705,7 @@
           <a:p>
             <a:fld id="{5413AE75-6D63-4E51-84FC-1D4679E4148F}" type="datetimeFigureOut">
               <a:rPr lang="en-US" smtClean="0"/>
-              <a:t>5/2/2023</a:t>
+              <a:t>5/3/2023</a:t>
             </a:fld>
             <a:endParaRPr lang="en-US"/>
           </a:p>
@@ -2946,7 +2946,7 @@
           <a:p>
             <a:fld id="{5413AE75-6D63-4E51-84FC-1D4679E4148F}" type="datetimeFigureOut">
               <a:rPr lang="en-US" smtClean="0"/>
-              <a:t>5/2/2023</a:t>
+              <a:t>5/3/2023</a:t>
             </a:fld>
             <a:endParaRPr lang="en-US"/>
           </a:p>
@@ -12656,7 +12656,7 @@
           <p:nvPr>
             <p:extLst>
               <p:ext uri="{D42A27DB-BD31-4B8C-83A1-F6EECF244321}">
-                <p14:modId xmlns:p14="http://schemas.microsoft.com/office/powerpoint/2010/main" val="2285829775"/>
+                <p14:modId xmlns:p14="http://schemas.microsoft.com/office/powerpoint/2010/main" val="1088481316"/>
               </p:ext>
             </p:extLst>
           </p:nvPr>
@@ -13553,6 +13553,88 @@
           <a:bodyPr/>
           <a:lstStyle/>
           <a:p>
+            <a:r>
+              <a:rPr lang="en-US" dirty="0"/>
+              <a:t>Spark Streaming</a:t>
+            </a:r>
+          </a:p>
+          <a:p>
+            <a:pPr lvl="1"/>
+            <a:r>
+              <a:rPr lang="en-US" dirty="0"/>
+              <a:t>spark-stream-btc.py</a:t>
+            </a:r>
+          </a:p>
+          <a:p>
+            <a:r>
+              <a:rPr lang="en-US" dirty="0"/>
+              <a:t>Kafka Producer</a:t>
+            </a:r>
+          </a:p>
+          <a:p>
+            <a:pPr lvl="1"/>
+            <a:r>
+              <a:rPr lang="en-US" dirty="0"/>
+              <a:t>Web-socket-</a:t>
+            </a:r>
+            <a:r>
+              <a:rPr lang="en-US" dirty="0" err="1"/>
+              <a:t>kafka</a:t>
+            </a:r>
+            <a:endParaRPr lang="en-US" dirty="0"/>
+          </a:p>
+          <a:p>
+            <a:r>
+              <a:rPr lang="en-US" dirty="0"/>
+              <a:t>Flask APIs:</a:t>
+            </a:r>
+          </a:p>
+          <a:p>
+            <a:pPr lvl="1"/>
+            <a:r>
+              <a:rPr lang="en-US" dirty="0"/>
+              <a:t>App.py</a:t>
+            </a:r>
+          </a:p>
+          <a:p>
+            <a:r>
+              <a:rPr lang="en-US" dirty="0"/>
+              <a:t>Live Dashboard Screen :</a:t>
+            </a:r>
+          </a:p>
+          <a:p>
+            <a:pPr lvl="1"/>
+            <a:r>
+              <a:rPr lang="en-US" sz="2400" dirty="0" err="1"/>
+              <a:t>Src</a:t>
+            </a:r>
+            <a:r>
+              <a:rPr lang="en-US" sz="2400" dirty="0"/>
+              <a:t>/</a:t>
+            </a:r>
+            <a:r>
+              <a:rPr lang="en-US" sz="2400" dirty="0" err="1"/>
+              <a:t>BigData</a:t>
+            </a:r>
+            <a:r>
+              <a:rPr lang="en-US" sz="2400" dirty="0"/>
+              <a:t>/Screens/</a:t>
+            </a:r>
+            <a:r>
+              <a:rPr lang="en-US" sz="2400" dirty="0" err="1"/>
+              <a:t>BTCBarChart.jsx</a:t>
+            </a:r>
+            <a:endParaRPr lang="en-US" sz="2800" dirty="0"/>
+          </a:p>
+          <a:p>
+            <a:pPr lvl="1"/>
+            <a:endParaRPr lang="en-US" dirty="0"/>
+          </a:p>
+          <a:p>
+            <a:pPr lvl="1"/>
+            <a:endParaRPr lang="en-US" dirty="0"/>
+          </a:p>
+          <a:p>
             <a:endParaRPr lang="en-US" dirty="0"/>
           </a:p>
         </p:txBody>
@@ -14399,7 +14481,7 @@
             <p:ph idx="1"/>
             <p:extLst>
               <p:ext uri="{D42A27DB-BD31-4B8C-83A1-F6EECF244321}">
-                <p14:modId xmlns:p14="http://schemas.microsoft.com/office/powerpoint/2010/main" val="4190448315"/>
+                <p14:modId xmlns:p14="http://schemas.microsoft.com/office/powerpoint/2010/main" val="3820289198"/>
               </p:ext>
             </p:extLst>
           </p:nvPr>

</xml_diff>

<commit_message>
added final project doc
</commit_message>
<xml_diff>
--- a/assets/CPSC 531 Final Presentation Real Time Analysis Of BTC Network Congestion.pptx
+++ b/assets/CPSC 531 Final Presentation Real Time Analysis Of BTC Network Congestion.pptx
@@ -20,19 +20,18 @@
     <p:sldId id="266" r:id="rId14"/>
     <p:sldId id="267" r:id="rId15"/>
     <p:sldId id="268" r:id="rId16"/>
-    <p:sldId id="269" r:id="rId17"/>
-    <p:sldId id="270" r:id="rId18"/>
-    <p:sldId id="284" r:id="rId19"/>
-    <p:sldId id="272" r:id="rId20"/>
-    <p:sldId id="275" r:id="rId21"/>
-    <p:sldId id="273" r:id="rId22"/>
-    <p:sldId id="274" r:id="rId23"/>
-    <p:sldId id="277" r:id="rId24"/>
-    <p:sldId id="278" r:id="rId25"/>
-    <p:sldId id="279" r:id="rId26"/>
-    <p:sldId id="280" r:id="rId27"/>
-    <p:sldId id="281" r:id="rId28"/>
-    <p:sldId id="282" r:id="rId29"/>
+    <p:sldId id="270" r:id="rId17"/>
+    <p:sldId id="284" r:id="rId18"/>
+    <p:sldId id="272" r:id="rId19"/>
+    <p:sldId id="275" r:id="rId20"/>
+    <p:sldId id="273" r:id="rId21"/>
+    <p:sldId id="274" r:id="rId22"/>
+    <p:sldId id="277" r:id="rId23"/>
+    <p:sldId id="278" r:id="rId24"/>
+    <p:sldId id="279" r:id="rId25"/>
+    <p:sldId id="280" r:id="rId26"/>
+    <p:sldId id="281" r:id="rId27"/>
+    <p:sldId id="282" r:id="rId28"/>
   </p:sldIdLst>
   <p:sldSz cx="12192000" cy="6858000"/>
   <p:notesSz cx="6858000" cy="9144000"/>
@@ -4139,33 +4138,7 @@
                 <a:effectLst/>
                 <a:latin typeface="Arial Unicode MS"/>
               </a:rPr>
-              <a:t>(</a:t>
-            </a:r>
-            <a:r>
-              <a:rPr kumimoji="0" lang="en-US" altLang="en-US" sz="1400" b="0" i="0" u="none" strike="noStrike" cap="none" normalizeH="0" baseline="0" dirty="0" err="1">
-                <a:ln>
-                  <a:noFill/>
-                </a:ln>
-                <a:solidFill>
-                  <a:srgbClr val="A9B7C6"/>
-                </a:solidFill>
-                <a:effectLst/>
-                <a:latin typeface="Arial Unicode MS"/>
-              </a:rPr>
-              <a:t>process_each_batch</a:t>
-            </a:r>
-            <a:r>
-              <a:rPr kumimoji="0" lang="en-US" altLang="en-US" sz="1400" b="0" i="0" u="none" strike="noStrike" cap="none" normalizeH="0" baseline="0" dirty="0">
-                <a:ln>
-                  <a:noFill/>
-                </a:ln>
-                <a:solidFill>
-                  <a:srgbClr val="A9B7C6"/>
-                </a:solidFill>
-                <a:effectLst/>
-                <a:latin typeface="Arial Unicode MS"/>
-              </a:rPr>
-              <a:t>)\</a:t>
+              <a:t>(process_each_batch)\</a:t>
             </a:r>
             <a:br>
               <a:rPr kumimoji="0" lang="en-US" altLang="en-US" sz="1400" b="0" i="0" u="none" strike="noStrike" cap="none" normalizeH="0" baseline="0" dirty="0">
@@ -12206,28 +12179,32 @@
           <a:p>
             <a:r>
               <a:rPr lang="en-US" dirty="0"/>
-              <a:t>Bitcoin Network congestion can be defined as, </a:t>
+              <a:t>When there are a large number of transactions waiting to be added to the blockchain, miners prioritize transactions based on the transaction fees that users are willing to pay.</a:t>
             </a:r>
           </a:p>
           <a:p>
             <a:r>
               <a:rPr lang="en-US" dirty="0"/>
-              <a:t>If the number of transactions is too high, and the transaction fees are too low, miners may not include the transaction in the next block they mine, resulting in delays in transaction confirmations </a:t>
-            </a:r>
-            <a:r>
-              <a:rPr lang="en-US" dirty="0" err="1"/>
-              <a:t>i.e</a:t>
-            </a:r>
+              <a:t>During times of network congestion, transaction fees tend to increase as users compete to have their transactions processed quickly.</a:t>
+            </a:r>
+          </a:p>
+          <a:p>
             <a:r>
               <a:rPr lang="en-US" dirty="0"/>
-              <a:t> Network Congestion</a:t>
+              <a:t>By analyzing the trends in transaction fees, we can gain insights into the level of network congestion.</a:t>
             </a:r>
           </a:p>
           <a:p>
             <a:r>
               <a:rPr lang="en-US" dirty="0"/>
-              <a:t>When there are a large number of transactions waiting to be added to the blockchain, miners prioritize transactions based on the transaction fees that users are willing to pay.</a:t>
-            </a:r>
+              <a:t>In sum, Higher fees == Network Congestion state</a:t>
+            </a:r>
+          </a:p>
+          <a:p>
+            <a:pPr marL="0" indent="0">
+              <a:buNone/>
+            </a:pPr>
+            <a:endParaRPr lang="en-US" dirty="0"/>
           </a:p>
           <a:p>
             <a:endParaRPr lang="en-US" dirty="0"/>
@@ -12269,104 +12246,6 @@
           <p:cNvPr id="2" name="Title 1">
             <a:extLst>
               <a:ext uri="{FF2B5EF4-FFF2-40B4-BE49-F238E27FC236}">
-                <a16:creationId xmlns:a16="http://schemas.microsoft.com/office/drawing/2014/main" id="{891F4333-5632-E7F4-97B1-08D811A00E4A}"/>
-              </a:ext>
-            </a:extLst>
-          </p:cNvPr>
-          <p:cNvSpPr>
-            <a:spLocks noGrp="1"/>
-          </p:cNvSpPr>
-          <p:nvPr>
-            <p:ph type="title"/>
-          </p:nvPr>
-        </p:nvSpPr>
-        <p:spPr/>
-        <p:txBody>
-          <a:bodyPr/>
-          <a:lstStyle/>
-          <a:p>
-            <a:r>
-              <a:rPr lang="en-US" dirty="0"/>
-              <a:t>Cont..</a:t>
-            </a:r>
-          </a:p>
-        </p:txBody>
-      </p:sp>
-      <p:sp>
-        <p:nvSpPr>
-          <p:cNvPr id="3" name="Content Placeholder 2">
-            <a:extLst>
-              <a:ext uri="{FF2B5EF4-FFF2-40B4-BE49-F238E27FC236}">
-                <a16:creationId xmlns:a16="http://schemas.microsoft.com/office/drawing/2014/main" id="{46FE681D-F426-A5DB-1A27-B89FE46EA3AB}"/>
-              </a:ext>
-            </a:extLst>
-          </p:cNvPr>
-          <p:cNvSpPr>
-            <a:spLocks noGrp="1"/>
-          </p:cNvSpPr>
-          <p:nvPr>
-            <p:ph idx="1"/>
-          </p:nvPr>
-        </p:nvSpPr>
-        <p:spPr/>
-        <p:txBody>
-          <a:bodyPr/>
-          <a:lstStyle/>
-          <a:p>
-            <a:r>
-              <a:rPr lang="en-US" dirty="0"/>
-              <a:t>During times of network congestion, transaction fees tend to increase as users compete to have their transactions processed quickly.</a:t>
-            </a:r>
-          </a:p>
-          <a:p>
-            <a:r>
-              <a:rPr lang="en-US" dirty="0"/>
-              <a:t>By analyzing the trends in transaction fees, we can gain insights into the level of network congestion.</a:t>
-            </a:r>
-          </a:p>
-          <a:p>
-            <a:r>
-              <a:rPr lang="en-US" dirty="0"/>
-              <a:t>In sum, Higher fees == Network Congestion state</a:t>
-            </a:r>
-          </a:p>
-        </p:txBody>
-      </p:sp>
-    </p:spTree>
-    <p:extLst>
-      <p:ext uri="{BB962C8B-B14F-4D97-AF65-F5344CB8AC3E}">
-        <p14:creationId xmlns:p14="http://schemas.microsoft.com/office/powerpoint/2010/main" val="3114470870"/>
-      </p:ext>
-    </p:extLst>
-  </p:cSld>
-  <p:clrMapOvr>
-    <a:masterClrMapping/>
-  </p:clrMapOvr>
-</p:sld>
-</file>
-
-<file path=ppt/slides/slide17.xml><?xml version="1.0" encoding="utf-8"?>
-<p:sld xmlns:a="http://schemas.openxmlformats.org/drawingml/2006/main" xmlns:r="http://schemas.openxmlformats.org/officeDocument/2006/relationships" xmlns:p="http://schemas.openxmlformats.org/presentationml/2006/main">
-  <p:cSld>
-    <p:spTree>
-      <p:nvGrpSpPr>
-        <p:cNvPr id="1" name=""/>
-        <p:cNvGrpSpPr/>
-        <p:nvPr/>
-      </p:nvGrpSpPr>
-      <p:grpSpPr>
-        <a:xfrm>
-          <a:off x="0" y="0"/>
-          <a:ext cx="0" cy="0"/>
-          <a:chOff x="0" y="0"/>
-          <a:chExt cx="0" cy="0"/>
-        </a:xfrm>
-      </p:grpSpPr>
-      <p:sp>
-        <p:nvSpPr>
-          <p:cNvPr id="2" name="Title 1">
-            <a:extLst>
-              <a:ext uri="{FF2B5EF4-FFF2-40B4-BE49-F238E27FC236}">
                 <a16:creationId xmlns:a16="http://schemas.microsoft.com/office/drawing/2014/main" id="{230F33DB-5B28-3566-2B56-CC9238F016E4}"/>
               </a:ext>
             </a:extLst>
@@ -12461,7 +12340,7 @@
           <a:p>
             <a:r>
               <a:rPr lang="en-US" dirty="0"/>
-              <a:t>For May, i.e. Realtime Streaming :</a:t>
+              <a:t>For May, estimate, i.e. Realtime Streaming :</a:t>
             </a:r>
           </a:p>
           <a:p>
@@ -12493,7 +12372,7 @@
 </p:sld>
 </file>
 
-<file path=ppt/slides/slide18.xml><?xml version="1.0" encoding="utf-8"?>
+<file path=ppt/slides/slide17.xml><?xml version="1.0" encoding="utf-8"?>
 <p:sld xmlns:a="http://schemas.openxmlformats.org/drawingml/2006/main" xmlns:r="http://schemas.openxmlformats.org/officeDocument/2006/relationships" xmlns:p="http://schemas.openxmlformats.org/presentationml/2006/main">
   <p:cSld>
     <p:spTree>
@@ -12574,7 +12453,7 @@
             <a:pPr lvl="1"/>
             <a:r>
               <a:rPr lang="en-US" dirty="0"/>
-              <a:t> there is a sudden increase in the number of users,</a:t>
+              <a:t> There is a sudden increase in the number of users,</a:t>
             </a:r>
           </a:p>
           <a:p>
@@ -12585,7 +12464,7 @@
             <a:pPr lvl="1"/>
             <a:r>
               <a:rPr lang="en-US" dirty="0"/>
-              <a:t> a surge in demand for Bitcoin transactions,</a:t>
+              <a:t> A surge in demand for Bitcoin transactions,</a:t>
             </a:r>
           </a:p>
           <a:p>
@@ -12596,7 +12475,7 @@
             <a:pPr lvl="1"/>
             <a:r>
               <a:rPr lang="en-US" dirty="0"/>
-              <a:t> or a limitation in the network's capacity to process transactions</a:t>
+              <a:t> Or a limitation in the network's capacity to process transactions</a:t>
             </a:r>
           </a:p>
         </p:txBody>
@@ -12614,7 +12493,7 @@
 </p:sld>
 </file>
 
-<file path=ppt/slides/slide19.xml><?xml version="1.0" encoding="utf-8"?>
+<file path=ppt/slides/slide18.xml><?xml version="1.0" encoding="utf-8"?>
 <p:sld xmlns:a="http://schemas.openxmlformats.org/drawingml/2006/main" xmlns:r="http://schemas.openxmlformats.org/officeDocument/2006/relationships" xmlns:p="http://schemas.openxmlformats.org/presentationml/2006/main">
   <p:cSld>
     <p:spTree>
@@ -12790,6 +12669,219 @@
 </p:sld>
 </file>
 
+<file path=ppt/slides/slide19.xml><?xml version="1.0" encoding="utf-8"?>
+<p:sld xmlns:a="http://schemas.openxmlformats.org/drawingml/2006/main" xmlns:r="http://schemas.openxmlformats.org/officeDocument/2006/relationships" xmlns:p="http://schemas.openxmlformats.org/presentationml/2006/main">
+  <p:cSld>
+    <p:spTree>
+      <p:nvGrpSpPr>
+        <p:cNvPr id="1" name=""/>
+        <p:cNvGrpSpPr/>
+        <p:nvPr/>
+      </p:nvGrpSpPr>
+      <p:grpSpPr>
+        <a:xfrm>
+          <a:off x="0" y="0"/>
+          <a:ext cx="0" cy="0"/>
+          <a:chOff x="0" y="0"/>
+          <a:chExt cx="0" cy="0"/>
+        </a:xfrm>
+      </p:grpSpPr>
+      <p:sp>
+        <p:nvSpPr>
+          <p:cNvPr id="2" name="Title 1">
+            <a:extLst>
+              <a:ext uri="{FF2B5EF4-FFF2-40B4-BE49-F238E27FC236}">
+                <a16:creationId xmlns:a16="http://schemas.microsoft.com/office/drawing/2014/main" id="{0524082B-ABC9-1552-136A-B5F782E9AF92}"/>
+              </a:ext>
+            </a:extLst>
+          </p:cNvPr>
+          <p:cNvSpPr>
+            <a:spLocks noGrp="1"/>
+          </p:cNvSpPr>
+          <p:nvPr>
+            <p:ph type="title"/>
+          </p:nvPr>
+        </p:nvSpPr>
+        <p:spPr/>
+        <p:txBody>
+          <a:bodyPr/>
+          <a:lstStyle/>
+          <a:p>
+            <a:r>
+              <a:rPr lang="en-US" dirty="0"/>
+              <a:t>Limitations</a:t>
+            </a:r>
+          </a:p>
+        </p:txBody>
+      </p:sp>
+      <p:sp>
+        <p:nvSpPr>
+          <p:cNvPr id="3" name="Content Placeholder 2">
+            <a:extLst>
+              <a:ext uri="{FF2B5EF4-FFF2-40B4-BE49-F238E27FC236}">
+                <a16:creationId xmlns:a16="http://schemas.microsoft.com/office/drawing/2014/main" id="{B7187AFC-83BE-190E-E6E8-E2E44BD8F4E0}"/>
+              </a:ext>
+            </a:extLst>
+          </p:cNvPr>
+          <p:cNvSpPr>
+            <a:spLocks noGrp="1"/>
+          </p:cNvSpPr>
+          <p:nvPr>
+            <p:ph idx="1"/>
+          </p:nvPr>
+        </p:nvSpPr>
+        <p:spPr/>
+        <p:txBody>
+          <a:bodyPr>
+            <a:normAutofit fontScale="92500" lnSpcReduction="10000"/>
+          </a:bodyPr>
+          <a:lstStyle/>
+          <a:p>
+            <a:r>
+              <a:rPr lang="en-US" dirty="0"/>
+              <a:t>Network Congestion is dependent upon various other factors, apart from transaction size.</a:t>
+            </a:r>
+          </a:p>
+          <a:p>
+            <a:pPr lvl="1"/>
+            <a:r>
+              <a:rPr lang="en-US" dirty="0"/>
+              <a:t>Transaction Volume</a:t>
+            </a:r>
+          </a:p>
+          <a:p>
+            <a:pPr lvl="1"/>
+            <a:r>
+              <a:rPr lang="en-US" dirty="0"/>
+              <a:t>Network Latency</a:t>
+            </a:r>
+          </a:p>
+          <a:p>
+            <a:pPr lvl="1"/>
+            <a:r>
+              <a:rPr lang="en-US" dirty="0"/>
+              <a:t>Transaction Confirmation Time </a:t>
+            </a:r>
+          </a:p>
+          <a:p>
+            <a:pPr lvl="1"/>
+            <a:r>
+              <a:rPr lang="en-US" dirty="0"/>
+              <a:t>Source: </a:t>
+            </a:r>
+            <a:r>
+              <a:rPr lang="en-US" dirty="0">
+                <a:hlinkClick r:id="rId2"/>
+              </a:rPr>
+              <a:t>https://wirexapp.com/help/article/my-blockchain-fee-is-too-high-why-what-should-i-do-0079</a:t>
+            </a:r>
+            <a:endParaRPr lang="en-US" dirty="0"/>
+          </a:p>
+          <a:p>
+            <a:pPr lvl="1"/>
+            <a:r>
+              <a:rPr lang="en-US" dirty="0">
+                <a:hlinkClick r:id="rId3"/>
+              </a:rPr>
+              <a:t>https://fortris.com/blog/bitcoin-transaction-time</a:t>
+            </a:r>
+            <a:endParaRPr lang="en-US" dirty="0"/>
+          </a:p>
+          <a:p>
+            <a:pPr lvl="1"/>
+            <a:endParaRPr lang="en-US" dirty="0"/>
+          </a:p>
+          <a:p>
+            <a:pPr lvl="1"/>
+            <a:endParaRPr lang="en-US" dirty="0"/>
+          </a:p>
+          <a:p>
+            <a:r>
+              <a:rPr lang="en-US" dirty="0"/>
+              <a:t>Hence, the linear relationship doesn’t exists, to apply for Linear Regression Model.</a:t>
+            </a:r>
+          </a:p>
+          <a:p>
+            <a:endParaRPr lang="en-US" dirty="0"/>
+          </a:p>
+        </p:txBody>
+      </p:sp>
+      <p:graphicFrame>
+        <p:nvGraphicFramePr>
+          <p:cNvPr id="4" name="Object 3">
+            <a:extLst>
+              <a:ext uri="{FF2B5EF4-FFF2-40B4-BE49-F238E27FC236}">
+                <a16:creationId xmlns:a16="http://schemas.microsoft.com/office/drawing/2014/main" id="{3034327C-F21F-1A72-3ABC-CEA8FE2EAFB8}"/>
+              </a:ext>
+            </a:extLst>
+          </p:cNvPr>
+          <p:cNvGraphicFramePr>
+            <a:graphicFrameLocks noChangeAspect="1"/>
+          </p:cNvGraphicFramePr>
+          <p:nvPr>
+            <p:extLst>
+              <p:ext uri="{D42A27DB-BD31-4B8C-83A1-F6EECF244321}">
+                <p14:modId xmlns:p14="http://schemas.microsoft.com/office/powerpoint/2010/main" val="1088481316"/>
+              </p:ext>
+            </p:extLst>
+          </p:nvPr>
+        </p:nvGraphicFramePr>
+        <p:xfrm>
+          <a:off x="1634986" y="5264914"/>
+          <a:ext cx="2340665" cy="1227961"/>
+        </p:xfrm>
+        <a:graphic>
+          <a:graphicData uri="http://schemas.openxmlformats.org/presentationml/2006/ole">
+            <mc:AlternateContent xmlns:mc="http://schemas.openxmlformats.org/markup-compatibility/2006">
+              <mc:Choice xmlns:v="urn:schemas-microsoft-com:vml" Requires="v">
+                <p:oleObj name="Packager Shell Object" showAsIcon="1" r:id="rId4" imgW="838800" imgH="440280" progId="Package">
+                  <p:embed/>
+                </p:oleObj>
+              </mc:Choice>
+              <mc:Fallback>
+                <p:oleObj name="Packager Shell Object" showAsIcon="1" r:id="rId4" imgW="838800" imgH="440280" progId="Package">
+                  <p:embed/>
+                  <p:pic>
+                    <p:nvPicPr>
+                      <p:cNvPr id="0" name=""/>
+                      <p:cNvPicPr/>
+                      <p:nvPr/>
+                    </p:nvPicPr>
+                    <p:blipFill>
+                      <a:blip r:embed="rId5"/>
+                      <a:stretch>
+                        <a:fillRect/>
+                      </a:stretch>
+                    </p:blipFill>
+                    <p:spPr>
+                      <a:xfrm>
+                        <a:off x="1634986" y="5264914"/>
+                        <a:ext cx="2340665" cy="1227961"/>
+                      </a:xfrm>
+                      <a:prstGeom prst="rect">
+                        <a:avLst/>
+                      </a:prstGeom>
+                    </p:spPr>
+                  </p:pic>
+                </p:oleObj>
+              </mc:Fallback>
+            </mc:AlternateContent>
+          </a:graphicData>
+        </a:graphic>
+      </p:graphicFrame>
+    </p:spTree>
+    <p:extLst>
+      <p:ext uri="{BB962C8B-B14F-4D97-AF65-F5344CB8AC3E}">
+        <p14:creationId xmlns:p14="http://schemas.microsoft.com/office/powerpoint/2010/main" val="2762117865"/>
+      </p:ext>
+    </p:extLst>
+  </p:cSld>
+  <p:clrMapOvr>
+    <a:masterClrMapping/>
+  </p:clrMapOvr>
+</p:sld>
+</file>
+
 <file path=ppt/slides/slide2.xml><?xml version="1.0" encoding="utf-8"?>
 <p:sld xmlns:a="http://schemas.openxmlformats.org/drawingml/2006/main" xmlns:r="http://schemas.openxmlformats.org/officeDocument/2006/relationships" xmlns:p="http://schemas.openxmlformats.org/presentationml/2006/main">
   <p:cSld>
@@ -12859,7 +12951,7 @@
         </p:spPr>
         <p:txBody>
           <a:bodyPr>
-            <a:normAutofit/>
+            <a:normAutofit lnSpcReduction="10000"/>
           </a:bodyPr>
           <a:lstStyle/>
           <a:p>
@@ -12879,7 +12971,7 @@
           <a:p>
             <a:r>
               <a:rPr lang="en-US" dirty="0"/>
-              <a:t>Confirmation and addition of transaction to ledger takes different time, varying with transaction size and miner capability.</a:t>
+              <a:t>Confirmation and addition of transaction to ledger takes different time, varying with transaction size, miner capability, transaction confirmation time and other factors.</a:t>
             </a:r>
           </a:p>
           <a:p>
@@ -12965,189 +13057,6 @@
           <p:cNvPr id="2" name="Title 1">
             <a:extLst>
               <a:ext uri="{FF2B5EF4-FFF2-40B4-BE49-F238E27FC236}">
-                <a16:creationId xmlns:a16="http://schemas.microsoft.com/office/drawing/2014/main" id="{0524082B-ABC9-1552-136A-B5F782E9AF92}"/>
-              </a:ext>
-            </a:extLst>
-          </p:cNvPr>
-          <p:cNvSpPr>
-            <a:spLocks noGrp="1"/>
-          </p:cNvSpPr>
-          <p:nvPr>
-            <p:ph type="title"/>
-          </p:nvPr>
-        </p:nvSpPr>
-        <p:spPr/>
-        <p:txBody>
-          <a:bodyPr/>
-          <a:lstStyle/>
-          <a:p>
-            <a:r>
-              <a:rPr lang="en-US" dirty="0"/>
-              <a:t>Limitations</a:t>
-            </a:r>
-          </a:p>
-        </p:txBody>
-      </p:sp>
-      <p:sp>
-        <p:nvSpPr>
-          <p:cNvPr id="3" name="Content Placeholder 2">
-            <a:extLst>
-              <a:ext uri="{FF2B5EF4-FFF2-40B4-BE49-F238E27FC236}">
-                <a16:creationId xmlns:a16="http://schemas.microsoft.com/office/drawing/2014/main" id="{B7187AFC-83BE-190E-E6E8-E2E44BD8F4E0}"/>
-              </a:ext>
-            </a:extLst>
-          </p:cNvPr>
-          <p:cNvSpPr>
-            <a:spLocks noGrp="1"/>
-          </p:cNvSpPr>
-          <p:nvPr>
-            <p:ph idx="1"/>
-          </p:nvPr>
-        </p:nvSpPr>
-        <p:spPr/>
-        <p:txBody>
-          <a:bodyPr/>
-          <a:lstStyle/>
-          <a:p>
-            <a:r>
-              <a:rPr lang="en-US" dirty="0"/>
-              <a:t>Network Congestion is dependent upon various other factors, apart from transaction size.</a:t>
-            </a:r>
-          </a:p>
-          <a:p>
-            <a:pPr lvl="1"/>
-            <a:r>
-              <a:rPr lang="en-US" dirty="0"/>
-              <a:t>Transaction Volume</a:t>
-            </a:r>
-          </a:p>
-          <a:p>
-            <a:pPr lvl="1"/>
-            <a:r>
-              <a:rPr lang="en-US" dirty="0"/>
-              <a:t>Network Latency</a:t>
-            </a:r>
-          </a:p>
-          <a:p>
-            <a:pPr lvl="1"/>
-            <a:r>
-              <a:rPr lang="en-US" dirty="0"/>
-              <a:t>Transaction Confirmation Time </a:t>
-            </a:r>
-          </a:p>
-          <a:p>
-            <a:pPr lvl="1"/>
-            <a:endParaRPr lang="en-US" dirty="0"/>
-          </a:p>
-          <a:p>
-            <a:r>
-              <a:rPr lang="en-US" dirty="0"/>
-              <a:t>Hence, the linear relationship doesn’t exists, to apply for Linear Regression Model.</a:t>
-            </a:r>
-          </a:p>
-          <a:p>
-            <a:endParaRPr lang="en-US" dirty="0"/>
-          </a:p>
-        </p:txBody>
-      </p:sp>
-      <p:graphicFrame>
-        <p:nvGraphicFramePr>
-          <p:cNvPr id="4" name="Object 3">
-            <a:extLst>
-              <a:ext uri="{FF2B5EF4-FFF2-40B4-BE49-F238E27FC236}">
-                <a16:creationId xmlns:a16="http://schemas.microsoft.com/office/drawing/2014/main" id="{3034327C-F21F-1A72-3ABC-CEA8FE2EAFB8}"/>
-              </a:ext>
-            </a:extLst>
-          </p:cNvPr>
-          <p:cNvGraphicFramePr>
-            <a:graphicFrameLocks noChangeAspect="1"/>
-          </p:cNvGraphicFramePr>
-          <p:nvPr>
-            <p:extLst>
-              <p:ext uri="{D42A27DB-BD31-4B8C-83A1-F6EECF244321}">
-                <p14:modId xmlns:p14="http://schemas.microsoft.com/office/powerpoint/2010/main" val="1088481316"/>
-              </p:ext>
-            </p:extLst>
-          </p:nvPr>
-        </p:nvGraphicFramePr>
-        <p:xfrm>
-          <a:off x="1634986" y="5264914"/>
-          <a:ext cx="2340665" cy="1227961"/>
-        </p:xfrm>
-        <a:graphic>
-          <a:graphicData uri="http://schemas.openxmlformats.org/presentationml/2006/ole">
-            <mc:AlternateContent xmlns:mc="http://schemas.openxmlformats.org/markup-compatibility/2006">
-              <mc:Choice xmlns:v="urn:schemas-microsoft-com:vml" Requires="v">
-                <p:oleObj name="Packager Shell Object" showAsIcon="1" r:id="rId2" imgW="838800" imgH="440280" progId="Package">
-                  <p:embed/>
-                </p:oleObj>
-              </mc:Choice>
-              <mc:Fallback>
-                <p:oleObj name="Packager Shell Object" showAsIcon="1" r:id="rId2" imgW="838800" imgH="440280" progId="Package">
-                  <p:embed/>
-                  <p:pic>
-                    <p:nvPicPr>
-                      <p:cNvPr id="0" name=""/>
-                      <p:cNvPicPr/>
-                      <p:nvPr/>
-                    </p:nvPicPr>
-                    <p:blipFill>
-                      <a:blip r:embed="rId3"/>
-                      <a:stretch>
-                        <a:fillRect/>
-                      </a:stretch>
-                    </p:blipFill>
-                    <p:spPr>
-                      <a:xfrm>
-                        <a:off x="1634986" y="5264914"/>
-                        <a:ext cx="2340665" cy="1227961"/>
-                      </a:xfrm>
-                      <a:prstGeom prst="rect">
-                        <a:avLst/>
-                      </a:prstGeom>
-                    </p:spPr>
-                  </p:pic>
-                </p:oleObj>
-              </mc:Fallback>
-            </mc:AlternateContent>
-          </a:graphicData>
-        </a:graphic>
-      </p:graphicFrame>
-    </p:spTree>
-    <p:extLst>
-      <p:ext uri="{BB962C8B-B14F-4D97-AF65-F5344CB8AC3E}">
-        <p14:creationId xmlns:p14="http://schemas.microsoft.com/office/powerpoint/2010/main" val="2762117865"/>
-      </p:ext>
-    </p:extLst>
-  </p:cSld>
-  <p:clrMapOvr>
-    <a:masterClrMapping/>
-  </p:clrMapOvr>
-</p:sld>
-</file>
-
-<file path=ppt/slides/slide21.xml><?xml version="1.0" encoding="utf-8"?>
-<p:sld xmlns:a="http://schemas.openxmlformats.org/drawingml/2006/main" xmlns:r="http://schemas.openxmlformats.org/officeDocument/2006/relationships" xmlns:p="http://schemas.openxmlformats.org/presentationml/2006/main">
-  <p:cSld>
-    <p:spTree>
-      <p:nvGrpSpPr>
-        <p:cNvPr id="1" name=""/>
-        <p:cNvGrpSpPr/>
-        <p:nvPr/>
-      </p:nvGrpSpPr>
-      <p:grpSpPr>
-        <a:xfrm>
-          <a:off x="0" y="0"/>
-          <a:ext cx="0" cy="0"/>
-          <a:chOff x="0" y="0"/>
-          <a:chExt cx="0" cy="0"/>
-        </a:xfrm>
-      </p:grpSpPr>
-      <p:sp>
-        <p:nvSpPr>
-          <p:cNvPr id="2" name="Title 1">
-            <a:extLst>
-              <a:ext uri="{FF2B5EF4-FFF2-40B4-BE49-F238E27FC236}">
                 <a16:creationId xmlns:a16="http://schemas.microsoft.com/office/drawing/2014/main" id="{7917ED54-8D80-99CF-1636-F56794A96CB7}"/>
               </a:ext>
             </a:extLst>
@@ -13258,7 +13167,7 @@
 </p:sld>
 </file>
 
-<file path=ppt/slides/slide22.xml><?xml version="1.0" encoding="utf-8"?>
+<file path=ppt/slides/slide21.xml><?xml version="1.0" encoding="utf-8"?>
 <p:sld xmlns:a="http://schemas.openxmlformats.org/drawingml/2006/main" xmlns:r="http://schemas.openxmlformats.org/officeDocument/2006/relationships" xmlns:p="http://schemas.openxmlformats.org/presentationml/2006/main">
   <p:cSld>
     <p:spTree>
@@ -13510,7 +13419,7 @@
 </p:sld>
 </file>
 
-<file path=ppt/slides/slide23.xml><?xml version="1.0" encoding="utf-8"?>
+<file path=ppt/slides/slide22.xml><?xml version="1.0" encoding="utf-8"?>
 <p:sld xmlns:a="http://schemas.openxmlformats.org/drawingml/2006/main" xmlns:r="http://schemas.openxmlformats.org/officeDocument/2006/relationships" xmlns:p="http://schemas.openxmlformats.org/presentationml/2006/main">
   <p:cSld>
     <p:spTree>
@@ -13642,7 +13551,7 @@
 </p:sld>
 </file>
 
-<file path=ppt/slides/slide24.xml><?xml version="1.0" encoding="utf-8"?>
+<file path=ppt/slides/slide23.xml><?xml version="1.0" encoding="utf-8"?>
 <p:sld xmlns:a="http://schemas.openxmlformats.org/drawingml/2006/main" xmlns:r="http://schemas.openxmlformats.org/officeDocument/2006/relationships" xmlns:p="http://schemas.openxmlformats.org/presentationml/2006/main">
   <p:cSld>
     <p:spTree>
@@ -13768,7 +13677,7 @@
 </p:sld>
 </file>
 
-<file path=ppt/slides/slide25.xml><?xml version="1.0" encoding="utf-8"?>
+<file path=ppt/slides/slide24.xml><?xml version="1.0" encoding="utf-8"?>
 <p:sld xmlns:a="http://schemas.openxmlformats.org/drawingml/2006/main" xmlns:r="http://schemas.openxmlformats.org/officeDocument/2006/relationships" xmlns:p="http://schemas.openxmlformats.org/presentationml/2006/main">
   <p:cSld>
     <p:spTree>
@@ -13933,7 +13842,7 @@
 </p:sld>
 </file>
 
-<file path=ppt/slides/slide26.xml><?xml version="1.0" encoding="utf-8"?>
+<file path=ppt/slides/slide25.xml><?xml version="1.0" encoding="utf-8"?>
 <p:sld xmlns:a="http://schemas.openxmlformats.org/drawingml/2006/main" xmlns:r="http://schemas.openxmlformats.org/officeDocument/2006/relationships" xmlns:p="http://schemas.openxmlformats.org/presentationml/2006/main">
   <p:cSld>
     <p:spTree>
@@ -14034,7 +13943,7 @@
 </p:sld>
 </file>
 
-<file path=ppt/slides/slide27.xml><?xml version="1.0" encoding="utf-8"?>
+<file path=ppt/slides/slide26.xml><?xml version="1.0" encoding="utf-8"?>
 <p:sld xmlns:a="http://schemas.openxmlformats.org/drawingml/2006/main" xmlns:r="http://schemas.openxmlformats.org/officeDocument/2006/relationships" xmlns:p="http://schemas.openxmlformats.org/presentationml/2006/main">
   <p:cSld>
     <p:spTree>
@@ -14153,7 +14062,7 @@
 </p:sld>
 </file>
 
-<file path=ppt/slides/slide28.xml><?xml version="1.0" encoding="utf-8"?>
+<file path=ppt/slides/slide27.xml><?xml version="1.0" encoding="utf-8"?>
 <p:sld xmlns:a="http://schemas.openxmlformats.org/drawingml/2006/main" xmlns:r="http://schemas.openxmlformats.org/officeDocument/2006/relationships" xmlns:p="http://schemas.openxmlformats.org/presentationml/2006/main">
   <p:cSld>
     <p:spTree>
@@ -14407,7 +14316,7 @@
           <a:p>
             <a:r>
               <a:rPr lang="en-US" dirty="0"/>
-              <a:t>Execution Overview</a:t>
+              <a:t>Implementation Overview</a:t>
             </a:r>
           </a:p>
         </p:txBody>
@@ -14522,37 +14431,6 @@
           <a:p>
             <a:pPr lvl="1"/>
             <a:endParaRPr lang="en-US" sz="800" dirty="0"/>
-          </a:p>
-        </p:txBody>
-      </p:sp>
-      <p:sp>
-        <p:nvSpPr>
-          <p:cNvPr id="4" name="Content Placeholder 3">
-            <a:extLst>
-              <a:ext uri="{FF2B5EF4-FFF2-40B4-BE49-F238E27FC236}">
-                <a16:creationId xmlns:a16="http://schemas.microsoft.com/office/drawing/2014/main" id="{1D630A52-A71B-3BD9-A497-9DEDEF2C9AA2}"/>
-              </a:ext>
-            </a:extLst>
-          </p:cNvPr>
-          <p:cNvSpPr>
-            <a:spLocks noGrp="1"/>
-          </p:cNvSpPr>
-          <p:nvPr>
-            <p:ph sz="half" idx="2"/>
-          </p:nvPr>
-        </p:nvSpPr>
-        <p:spPr/>
-        <p:txBody>
-          <a:bodyPr>
-            <a:normAutofit/>
-          </a:bodyPr>
-          <a:lstStyle/>
-          <a:p>
-            <a:pPr lvl="1"/>
-            <a:endParaRPr lang="en-US" sz="900" dirty="0"/>
-          </a:p>
-          <a:p>
-            <a:endParaRPr lang="en-US" sz="3600" dirty="0"/>
           </a:p>
         </p:txBody>
       </p:sp>
@@ -14890,7 +14768,7 @@
             <p:ph idx="1"/>
             <p:extLst>
               <p:ext uri="{D42A27DB-BD31-4B8C-83A1-F6EECF244321}">
-                <p14:modId xmlns:p14="http://schemas.microsoft.com/office/powerpoint/2010/main" val="3820289198"/>
+                <p14:modId xmlns:p14="http://schemas.microsoft.com/office/powerpoint/2010/main" val="3446408745"/>
               </p:ext>
             </p:extLst>
           </p:nvPr>

</xml_diff>